<commit_message>
added plots, cleaned analyses
</commit_message>
<xml_diff>
--- a/xt_2007b_replication/overviews/Wug Overview.pptx
+++ b/xt_2007b_replication/overviews/Wug Overview.pptx
@@ -297,7 +297,7 @@
           <a:p>
             <a:fld id="{8D6A9977-C28E-D142-A374-1816BD5C70DD}" type="datetimeFigureOut">
               <a:rPr lang="en-US" smtClean="0"/>
-              <a:t>9/16/12</a:t>
+              <a:t>9/5/15</a:t>
             </a:fld>
             <a:endParaRPr lang="en-US"/>
           </a:p>
@@ -467,7 +467,7 @@
           <a:p>
             <a:fld id="{8D6A9977-C28E-D142-A374-1816BD5C70DD}" type="datetimeFigureOut">
               <a:rPr lang="en-US" smtClean="0"/>
-              <a:t>9/16/12</a:t>
+              <a:t>9/5/15</a:t>
             </a:fld>
             <a:endParaRPr lang="en-US"/>
           </a:p>
@@ -647,7 +647,7 @@
           <a:p>
             <a:fld id="{8D6A9977-C28E-D142-A374-1816BD5C70DD}" type="datetimeFigureOut">
               <a:rPr lang="en-US" smtClean="0"/>
-              <a:t>9/16/12</a:t>
+              <a:t>9/5/15</a:t>
             </a:fld>
             <a:endParaRPr lang="en-US"/>
           </a:p>
@@ -817,7 +817,7 @@
           <a:p>
             <a:fld id="{8D6A9977-C28E-D142-A374-1816BD5C70DD}" type="datetimeFigureOut">
               <a:rPr lang="en-US" smtClean="0"/>
-              <a:t>9/16/12</a:t>
+              <a:t>9/5/15</a:t>
             </a:fld>
             <a:endParaRPr lang="en-US"/>
           </a:p>
@@ -1063,7 +1063,7 @@
           <a:p>
             <a:fld id="{8D6A9977-C28E-D142-A374-1816BD5C70DD}" type="datetimeFigureOut">
               <a:rPr lang="en-US" smtClean="0"/>
-              <a:t>9/16/12</a:t>
+              <a:t>9/5/15</a:t>
             </a:fld>
             <a:endParaRPr lang="en-US"/>
           </a:p>
@@ -1351,7 +1351,7 @@
           <a:p>
             <a:fld id="{8D6A9977-C28E-D142-A374-1816BD5C70DD}" type="datetimeFigureOut">
               <a:rPr lang="en-US" smtClean="0"/>
-              <a:t>9/16/12</a:t>
+              <a:t>9/5/15</a:t>
             </a:fld>
             <a:endParaRPr lang="en-US"/>
           </a:p>
@@ -1773,7 +1773,7 @@
           <a:p>
             <a:fld id="{8D6A9977-C28E-D142-A374-1816BD5C70DD}" type="datetimeFigureOut">
               <a:rPr lang="en-US" smtClean="0"/>
-              <a:t>9/16/12</a:t>
+              <a:t>9/5/15</a:t>
             </a:fld>
             <a:endParaRPr lang="en-US"/>
           </a:p>
@@ -1891,7 +1891,7 @@
           <a:p>
             <a:fld id="{8D6A9977-C28E-D142-A374-1816BD5C70DD}" type="datetimeFigureOut">
               <a:rPr lang="en-US" smtClean="0"/>
-              <a:t>9/16/12</a:t>
+              <a:t>9/5/15</a:t>
             </a:fld>
             <a:endParaRPr lang="en-US"/>
           </a:p>
@@ -1986,7 +1986,7 @@
           <a:p>
             <a:fld id="{8D6A9977-C28E-D142-A374-1816BD5C70DD}" type="datetimeFigureOut">
               <a:rPr lang="en-US" smtClean="0"/>
-              <a:t>9/16/12</a:t>
+              <a:t>9/5/15</a:t>
             </a:fld>
             <a:endParaRPr lang="en-US"/>
           </a:p>
@@ -2263,7 +2263,7 @@
           <a:p>
             <a:fld id="{8D6A9977-C28E-D142-A374-1816BD5C70DD}" type="datetimeFigureOut">
               <a:rPr lang="en-US" smtClean="0"/>
-              <a:t>9/16/12</a:t>
+              <a:t>9/5/15</a:t>
             </a:fld>
             <a:endParaRPr lang="en-US"/>
           </a:p>
@@ -2516,7 +2516,7 @@
           <a:p>
             <a:fld id="{8D6A9977-C28E-D142-A374-1816BD5C70DD}" type="datetimeFigureOut">
               <a:rPr lang="en-US" smtClean="0"/>
-              <a:t>9/16/12</a:t>
+              <a:t>9/5/15</a:t>
             </a:fld>
             <a:endParaRPr lang="en-US"/>
           </a:p>
@@ -2729,7 +2729,7 @@
           <a:p>
             <a:fld id="{8D6A9977-C28E-D142-A374-1816BD5C70DD}" type="datetimeFigureOut">
               <a:rPr lang="en-US" smtClean="0"/>
-              <a:t>9/16/12</a:t>
+              <a:t>9/5/15</a:t>
             </a:fld>
             <a:endParaRPr lang="en-US"/>
           </a:p>
@@ -4778,7 +4778,21 @@
                 <a:latin typeface="Times"/>
                 <a:cs typeface="Times"/>
               </a:rPr>
-              <a:t> 2007a, with extension to across category generalization</a:t>
+              <a:t> </a:t>
+            </a:r>
+            <a:r>
+              <a:rPr lang="en-US" sz="1400" dirty="0" smtClean="0">
+                <a:latin typeface="Times"/>
+                <a:cs typeface="Times"/>
+              </a:rPr>
+              <a:t>2007b, </a:t>
+            </a:r>
+            <a:r>
+              <a:rPr lang="en-US" sz="1400" dirty="0" smtClean="0">
+                <a:latin typeface="Times"/>
+                <a:cs typeface="Times"/>
+              </a:rPr>
+              <a:t>with extension to across category generalization</a:t>
             </a:r>
           </a:p>
           <a:p>
@@ -7585,25 +7599,8 @@
                 <a:latin typeface="Times"/>
                 <a:cs typeface="Times"/>
               </a:rPr>
-              <a:t>See pattern, just </a:t>
-            </a:r>
-            <a:r>
-              <a:rPr lang="en-US" sz="800" smtClean="0">
-                <a:solidFill>
-                  <a:srgbClr val="000000"/>
-                </a:solidFill>
-                <a:latin typeface="Times"/>
-                <a:cs typeface="Times"/>
-              </a:rPr>
-              <a:t>LESS conservative</a:t>
-            </a:r>
-            <a:endParaRPr lang="en-US" sz="800" dirty="0" smtClean="0">
-              <a:solidFill>
-                <a:srgbClr val="000000"/>
-              </a:solidFill>
-              <a:latin typeface="Times"/>
-              <a:cs typeface="Times"/>
-            </a:endParaRPr>
+              <a:t>See pattern, just LESS conservative</a:t>
+            </a:r>
           </a:p>
           <a:p>
             <a:pPr marL="800100" lvl="3" indent="-342900">

</xml_diff>

<commit_message>
added procedures to exp 3
</commit_message>
<xml_diff>
--- a/xt_2007b_replication/overviews/Wug Overview.pptx
+++ b/xt_2007b_replication/overviews/Wug Overview.pptx
@@ -298,7 +298,7 @@
           <a:p>
             <a:fld id="{8D6A9977-C28E-D142-A374-1816BD5C70DD}" type="datetimeFigureOut">
               <a:rPr lang="en-US" smtClean="0"/>
-              <a:t>9/6/15</a:t>
+              <a:t>9/14/15</a:t>
             </a:fld>
             <a:endParaRPr lang="en-US"/>
           </a:p>
@@ -468,7 +468,7 @@
           <a:p>
             <a:fld id="{8D6A9977-C28E-D142-A374-1816BD5C70DD}" type="datetimeFigureOut">
               <a:rPr lang="en-US" smtClean="0"/>
-              <a:t>9/6/15</a:t>
+              <a:t>9/14/15</a:t>
             </a:fld>
             <a:endParaRPr lang="en-US"/>
           </a:p>
@@ -648,7 +648,7 @@
           <a:p>
             <a:fld id="{8D6A9977-C28E-D142-A374-1816BD5C70DD}" type="datetimeFigureOut">
               <a:rPr lang="en-US" smtClean="0"/>
-              <a:t>9/6/15</a:t>
+              <a:t>9/14/15</a:t>
             </a:fld>
             <a:endParaRPr lang="en-US"/>
           </a:p>
@@ -818,7 +818,7 @@
           <a:p>
             <a:fld id="{8D6A9977-C28E-D142-A374-1816BD5C70DD}" type="datetimeFigureOut">
               <a:rPr lang="en-US" smtClean="0"/>
-              <a:t>9/6/15</a:t>
+              <a:t>9/14/15</a:t>
             </a:fld>
             <a:endParaRPr lang="en-US"/>
           </a:p>
@@ -1064,7 +1064,7 @@
           <a:p>
             <a:fld id="{8D6A9977-C28E-D142-A374-1816BD5C70DD}" type="datetimeFigureOut">
               <a:rPr lang="en-US" smtClean="0"/>
-              <a:t>9/6/15</a:t>
+              <a:t>9/14/15</a:t>
             </a:fld>
             <a:endParaRPr lang="en-US"/>
           </a:p>
@@ -1352,7 +1352,7 @@
           <a:p>
             <a:fld id="{8D6A9977-C28E-D142-A374-1816BD5C70DD}" type="datetimeFigureOut">
               <a:rPr lang="en-US" smtClean="0"/>
-              <a:t>9/6/15</a:t>
+              <a:t>9/14/15</a:t>
             </a:fld>
             <a:endParaRPr lang="en-US"/>
           </a:p>
@@ -1774,7 +1774,7 @@
           <a:p>
             <a:fld id="{8D6A9977-C28E-D142-A374-1816BD5C70DD}" type="datetimeFigureOut">
               <a:rPr lang="en-US" smtClean="0"/>
-              <a:t>9/6/15</a:t>
+              <a:t>9/14/15</a:t>
             </a:fld>
             <a:endParaRPr lang="en-US"/>
           </a:p>
@@ -1892,7 +1892,7 @@
           <a:p>
             <a:fld id="{8D6A9977-C28E-D142-A374-1816BD5C70DD}" type="datetimeFigureOut">
               <a:rPr lang="en-US" smtClean="0"/>
-              <a:t>9/6/15</a:t>
+              <a:t>9/14/15</a:t>
             </a:fld>
             <a:endParaRPr lang="en-US"/>
           </a:p>
@@ -1987,7 +1987,7 @@
           <a:p>
             <a:fld id="{8D6A9977-C28E-D142-A374-1816BD5C70DD}" type="datetimeFigureOut">
               <a:rPr lang="en-US" smtClean="0"/>
-              <a:t>9/6/15</a:t>
+              <a:t>9/14/15</a:t>
             </a:fld>
             <a:endParaRPr lang="en-US"/>
           </a:p>
@@ -2264,7 +2264,7 @@
           <a:p>
             <a:fld id="{8D6A9977-C28E-D142-A374-1816BD5C70DD}" type="datetimeFigureOut">
               <a:rPr lang="en-US" smtClean="0"/>
-              <a:t>9/6/15</a:t>
+              <a:t>9/14/15</a:t>
             </a:fld>
             <a:endParaRPr lang="en-US"/>
           </a:p>
@@ -2517,7 +2517,7 @@
           <a:p>
             <a:fld id="{8D6A9977-C28E-D142-A374-1816BD5C70DD}" type="datetimeFigureOut">
               <a:rPr lang="en-US" smtClean="0"/>
-              <a:t>9/6/15</a:t>
+              <a:t>9/14/15</a:t>
             </a:fld>
             <a:endParaRPr lang="en-US"/>
           </a:p>
@@ -2730,7 +2730,7 @@
           <a:p>
             <a:fld id="{8D6A9977-C28E-D142-A374-1816BD5C70DD}" type="datetimeFigureOut">
               <a:rPr lang="en-US" smtClean="0"/>
-              <a:t>9/6/15</a:t>
+              <a:t>9/14/15</a:t>
             </a:fld>
             <a:endParaRPr lang="en-US"/>
           </a:p>
@@ -4390,6 +4390,32 @@
           </a:p>
         </p:txBody>
       </p:sp>
+      <p:sp>
+        <p:nvSpPr>
+          <p:cNvPr id="2" name="TextBox 1"/>
+          <p:cNvSpPr txBox="1"/>
+          <p:nvPr/>
+        </p:nvSpPr>
+        <p:spPr>
+          <a:xfrm>
+            <a:off x="1066234" y="2586815"/>
+            <a:ext cx="184666" cy="369332"/>
+          </a:xfrm>
+          <a:prstGeom prst="rect">
+            <a:avLst/>
+          </a:prstGeom>
+          <a:noFill/>
+        </p:spPr>
+        <p:txBody>
+          <a:bodyPr wrap="none" rtlCol="0">
+            <a:spAutoFit/>
+          </a:bodyPr>
+          <a:lstStyle/>
+          <a:p>
+            <a:endParaRPr lang="en-US" dirty="0"/>
+          </a:p>
+        </p:txBody>
+      </p:sp>
     </p:spTree>
     <p:extLst>
       <p:ext uri="{BB962C8B-B14F-4D97-AF65-F5344CB8AC3E}">
@@ -4471,31 +4497,7 @@
                   <a:srgbClr val="FF0000"/>
                 </a:solidFill>
               </a:rPr>
-              <a:t> </a:t>
-            </a:r>
-            <a:r>
-              <a:rPr lang="en-US" sz="2500" b="1" dirty="0" smtClean="0">
-                <a:solidFill>
-                  <a:srgbClr val="FF0000"/>
-                </a:solidFill>
-              </a:rPr>
-              <a:t>(“</a:t>
-            </a:r>
-            <a:r>
-              <a:rPr lang="en-US" sz="2500" b="1" dirty="0" smtClean="0">
-                <a:solidFill>
-                  <a:srgbClr val="FF0000"/>
-                </a:solidFill>
-              </a:rPr>
-              <a:t>wug7”</a:t>
-            </a:r>
-            <a:r>
-              <a:rPr lang="en-US" sz="2500" b="1" dirty="0" smtClean="0">
-                <a:solidFill>
-                  <a:srgbClr val="FF0000"/>
-                </a:solidFill>
-              </a:rPr>
-              <a:t>)</a:t>
+              <a:t> (“wug7”)</a:t>
             </a:r>
             <a:endParaRPr lang="en-US" sz="2500" b="1" dirty="0">
               <a:solidFill>
@@ -4709,10 +4711,6 @@
               </a:rPr>
               <a:t>replicates!</a:t>
             </a:r>
-            <a:endParaRPr lang="en-US" sz="2400" dirty="0" smtClean="0">
-              <a:latin typeface="Times"/>
-              <a:cs typeface="Times"/>
-            </a:endParaRPr>
           </a:p>
         </p:txBody>
       </p:sp>
@@ -7545,21 +7543,7 @@
                 <a:latin typeface="Times"/>
                 <a:cs typeface="Times"/>
               </a:rPr>
-              <a:t>Complete replication of wug2-4 (but, without no-label </a:t>
-            </a:r>
-            <a:r>
-              <a:rPr lang="en-US" sz="1400" dirty="0" smtClean="0">
-                <a:latin typeface="Times"/>
-                <a:cs typeface="Times"/>
-              </a:rPr>
-              <a:t>condition in </a:t>
-            </a:r>
-            <a:r>
-              <a:rPr lang="en-US" sz="1400" dirty="0" smtClean="0">
-                <a:latin typeface="Times"/>
-                <a:cs typeface="Times"/>
-              </a:rPr>
-              <a:t>4)</a:t>
+              <a:t>Complete replication of wug2-4 (but, without no-label condition in 4)</a:t>
             </a:r>
           </a:p>
           <a:p>

</xml_diff>